<commit_message>
change login and register problems + evolution of login
</commit_message>
<xml_diff>
--- a/ux_course/מסכים.pptx
+++ b/ux_course/מסכים.pptx
@@ -272,6 +272,18 @@
 </p:presentation>
 </file>
 
+<file path=ppt/commentAuthors.xml><?xml version="1.0" encoding="utf-8"?>
+<p:cmAuthorLst xmlns:a="http://schemas.openxmlformats.org/drawingml/2006/main" xmlns:r="http://schemas.openxmlformats.org/officeDocument/2006/relationships" xmlns:p="http://schemas.openxmlformats.org/presentationml/2006/main">
+  <p:cmAuthor id="1" name="Zeligman" initials="Z" lastIdx="1" clrIdx="0">
+    <p:extLst>
+      <p:ext uri="{19B8F6BF-5375-455C-9EA6-DF929625EA0E}">
+        <p15:presenceInfo xmlns:p15="http://schemas.microsoft.com/office/powerpoint/2012/main" userId="Zeligman" providerId="None"/>
+      </p:ext>
+    </p:extLst>
+  </p:cmAuthor>
+</p:cmAuthorLst>
+</file>
+
 <file path=ppt/notesMasters/notesMaster1.xml><?xml version="1.0" encoding="utf-8"?>
 <p:notesMaster xmlns:a="http://schemas.openxmlformats.org/drawingml/2006/main" xmlns:r="http://schemas.openxmlformats.org/officeDocument/2006/relationships" xmlns:p="http://schemas.openxmlformats.org/presentationml/2006/main">
   <p:cSld>
@@ -742,7 +754,7 @@
         </p:nvSpPr>
         <p:spPr>
           <a:xfrm>
-            <a:off x="381300" y="685800"/>
+            <a:off x="381000" y="685800"/>
             <a:ext cx="6096000" cy="3429000"/>
           </a:xfrm>
           <a:custGeom>
@@ -6936,7 +6948,7 @@
         <p:spPr>
           <a:xfrm>
             <a:off x="2542200" y="867750"/>
-            <a:ext cx="4059600" cy="3408000"/>
+            <a:ext cx="4059600" cy="3661720"/>
           </a:xfrm>
           <a:prstGeom prst="rect">
             <a:avLst/>
@@ -6976,7 +6988,7 @@
               </a:spcAft>
               <a:buNone/>
             </a:pPr>
-            <a:endParaRPr/>
+            <a:endParaRPr dirty="0"/>
           </a:p>
         </p:txBody>
       </p:sp>
@@ -7068,14 +7080,14 @@
               <a:buNone/>
             </a:pPr>
             <a:r>
-              <a:rPr lang="iw" sz="1800" b="1">
+              <a:rPr lang="iw" sz="1800" b="1" dirty="0">
                 <a:solidFill>
                   <a:srgbClr val="FFFFFF"/>
                 </a:solidFill>
               </a:rPr>
               <a:t>התחברות</a:t>
             </a:r>
-            <a:endParaRPr sz="1800" b="1">
+            <a:endParaRPr sz="1800" b="1" dirty="0">
               <a:solidFill>
                 <a:srgbClr val="FFFFFF"/>
               </a:solidFill>
@@ -7085,205 +7097,13 @@
       </p:sp>
       <p:sp>
         <p:nvSpPr>
-          <p:cNvPr id="59" name="Google Shape;59;p13"/>
-          <p:cNvSpPr/>
-          <p:nvPr/>
-        </p:nvSpPr>
-        <p:spPr>
-          <a:xfrm>
-            <a:off x="2938650" y="1895325"/>
-            <a:ext cx="3348600" cy="437400"/>
-          </a:xfrm>
-          <a:prstGeom prst="rect">
-            <a:avLst/>
-          </a:prstGeom>
-          <a:solidFill>
-            <a:srgbClr val="FFFFFF"/>
-          </a:solidFill>
-          <a:ln w="9525" cap="flat" cmpd="sng">
-            <a:solidFill>
-              <a:srgbClr val="B4D0E7"/>
-            </a:solidFill>
-            <a:prstDash val="solid"/>
-            <a:round/>
-            <a:headEnd type="none" w="sm" len="sm"/>
-            <a:tailEnd type="none" w="sm" len="sm"/>
-          </a:ln>
-        </p:spPr>
-        <p:txBody>
-          <a:bodyPr spcFirstLastPara="1" wrap="square" lIns="91425" tIns="91425" rIns="91425" bIns="91425" anchor="ctr" anchorCtr="0">
-            <a:noAutofit/>
-          </a:bodyPr>
-          <a:lstStyle/>
-          <a:p>
-            <a:pPr marL="0" lvl="0" indent="0" algn="l" rtl="0">
-              <a:spcBef>
-                <a:spcPts val="0"/>
-              </a:spcBef>
-              <a:spcAft>
-                <a:spcPts val="0"/>
-              </a:spcAft>
-              <a:buNone/>
-            </a:pPr>
-            <a:endParaRPr/>
-          </a:p>
-        </p:txBody>
-      </p:sp>
-      <p:sp>
-        <p:nvSpPr>
-          <p:cNvPr id="60" name="Google Shape;60;p13"/>
-          <p:cNvSpPr txBox="1"/>
-          <p:nvPr/>
-        </p:nvSpPr>
-        <p:spPr>
-          <a:xfrm>
-            <a:off x="4742850" y="1895325"/>
-            <a:ext cx="1476300" cy="437400"/>
-          </a:xfrm>
-          <a:prstGeom prst="rect">
-            <a:avLst/>
-          </a:prstGeom>
-          <a:noFill/>
-          <a:ln>
-            <a:noFill/>
-          </a:ln>
-        </p:spPr>
-        <p:txBody>
-          <a:bodyPr spcFirstLastPara="1" wrap="square" lIns="91425" tIns="91425" rIns="91425" bIns="91425" anchor="t" anchorCtr="0">
-            <a:noAutofit/>
-          </a:bodyPr>
-          <a:lstStyle/>
-          <a:p>
-            <a:pPr marL="0" lvl="0" indent="0" algn="r" rtl="1">
-              <a:spcBef>
-                <a:spcPts val="0"/>
-              </a:spcBef>
-              <a:spcAft>
-                <a:spcPts val="0"/>
-              </a:spcAft>
-              <a:buNone/>
-            </a:pPr>
-            <a:r>
-              <a:rPr lang="iw">
-                <a:solidFill>
-                  <a:srgbClr val="999999"/>
-                </a:solidFill>
-              </a:rPr>
-              <a:t>שם משתמש</a:t>
-            </a:r>
-            <a:endParaRPr>
-              <a:solidFill>
-                <a:srgbClr val="999999"/>
-              </a:solidFill>
-            </a:endParaRPr>
-          </a:p>
-        </p:txBody>
-      </p:sp>
-      <p:sp>
-        <p:nvSpPr>
-          <p:cNvPr id="61" name="Google Shape;61;p13"/>
-          <p:cNvSpPr/>
-          <p:nvPr/>
-        </p:nvSpPr>
-        <p:spPr>
-          <a:xfrm>
-            <a:off x="2938650" y="2571750"/>
-            <a:ext cx="3348600" cy="437400"/>
-          </a:xfrm>
-          <a:prstGeom prst="rect">
-            <a:avLst/>
-          </a:prstGeom>
-          <a:solidFill>
-            <a:srgbClr val="FFFFFF"/>
-          </a:solidFill>
-          <a:ln w="9525" cap="flat" cmpd="sng">
-            <a:solidFill>
-              <a:srgbClr val="B4D0E7"/>
-            </a:solidFill>
-            <a:prstDash val="solid"/>
-            <a:round/>
-            <a:headEnd type="none" w="sm" len="sm"/>
-            <a:tailEnd type="none" w="sm" len="sm"/>
-          </a:ln>
-        </p:spPr>
-        <p:txBody>
-          <a:bodyPr spcFirstLastPara="1" wrap="square" lIns="91425" tIns="91425" rIns="91425" bIns="91425" anchor="ctr" anchorCtr="0">
-            <a:noAutofit/>
-          </a:bodyPr>
-          <a:lstStyle/>
-          <a:p>
-            <a:pPr marL="0" lvl="0" indent="0" algn="l" rtl="0">
-              <a:spcBef>
-                <a:spcPts val="0"/>
-              </a:spcBef>
-              <a:spcAft>
-                <a:spcPts val="0"/>
-              </a:spcAft>
-              <a:buNone/>
-            </a:pPr>
-            <a:endParaRPr/>
-          </a:p>
-        </p:txBody>
-      </p:sp>
-      <p:sp>
-        <p:nvSpPr>
-          <p:cNvPr id="62" name="Google Shape;62;p13"/>
-          <p:cNvSpPr txBox="1"/>
-          <p:nvPr/>
-        </p:nvSpPr>
-        <p:spPr>
-          <a:xfrm>
-            <a:off x="4742850" y="2571750"/>
-            <a:ext cx="1476300" cy="437400"/>
-          </a:xfrm>
-          <a:prstGeom prst="rect">
-            <a:avLst/>
-          </a:prstGeom>
-          <a:noFill/>
-          <a:ln>
-            <a:noFill/>
-          </a:ln>
-        </p:spPr>
-        <p:txBody>
-          <a:bodyPr spcFirstLastPara="1" wrap="square" lIns="91425" tIns="91425" rIns="91425" bIns="91425" anchor="t" anchorCtr="0">
-            <a:noAutofit/>
-          </a:bodyPr>
-          <a:lstStyle/>
-          <a:p>
-            <a:pPr marL="0" lvl="0" indent="0" algn="r" rtl="1">
-              <a:spcBef>
-                <a:spcPts val="0"/>
-              </a:spcBef>
-              <a:spcAft>
-                <a:spcPts val="0"/>
-              </a:spcAft>
-              <a:buNone/>
-            </a:pPr>
-            <a:r>
-              <a:rPr lang="iw">
-                <a:solidFill>
-                  <a:srgbClr val="999999"/>
-                </a:solidFill>
-              </a:rPr>
-              <a:t>סיסמא</a:t>
-            </a:r>
-            <a:endParaRPr>
-              <a:solidFill>
-                <a:srgbClr val="999999"/>
-              </a:solidFill>
-            </a:endParaRPr>
-          </a:p>
-        </p:txBody>
-      </p:sp>
-      <p:sp>
-        <p:nvSpPr>
           <p:cNvPr id="63" name="Google Shape;63;p13"/>
           <p:cNvSpPr/>
           <p:nvPr/>
         </p:nvSpPr>
         <p:spPr>
           <a:xfrm>
-            <a:off x="5193900" y="3480825"/>
+            <a:off x="3019645" y="3639919"/>
             <a:ext cx="1093500" cy="437400"/>
           </a:xfrm>
           <a:prstGeom prst="rect">
@@ -7325,14 +7145,14 @@
               <a:buNone/>
             </a:pPr>
             <a:r>
-              <a:rPr lang="iw">
+              <a:rPr lang="iw" dirty="0">
                 <a:solidFill>
                   <a:srgbClr val="FFFFFF"/>
                 </a:solidFill>
               </a:rPr>
               <a:t>התחבר</a:t>
             </a:r>
-            <a:endParaRPr>
+            <a:endParaRPr dirty="0">
               <a:solidFill>
                 <a:srgbClr val="FFFFFF"/>
               </a:solidFill>
@@ -7340,68 +7160,405 @@
           </a:p>
         </p:txBody>
       </p:sp>
-      <p:sp>
-        <p:nvSpPr>
-          <p:cNvPr id="64" name="Google Shape;64;p13"/>
-          <p:cNvSpPr/>
-          <p:nvPr/>
-        </p:nvSpPr>
-        <p:spPr>
-          <a:xfrm>
-            <a:off x="2938650" y="3480825"/>
-            <a:ext cx="1093500" cy="437400"/>
-          </a:xfrm>
-          <a:prstGeom prst="rect">
-            <a:avLst/>
-          </a:prstGeom>
-          <a:solidFill>
-            <a:srgbClr val="B4D0E7"/>
-          </a:solidFill>
-          <a:ln w="9525" cap="flat" cmpd="sng">
+      <p:cxnSp>
+        <p:nvCxnSpPr>
+          <p:cNvPr id="3" name="מחבר ישר 2">
+            <a:extLst>
+              <a:ext uri="{FF2B5EF4-FFF2-40B4-BE49-F238E27FC236}">
+                <a16:creationId xmlns:a16="http://schemas.microsoft.com/office/drawing/2014/main" id="{46CBFCB2-2259-4249-8FC0-5A226C314966}"/>
+              </a:ext>
+            </a:extLst>
+          </p:cNvPr>
+          <p:cNvCxnSpPr/>
+          <p:nvPr/>
+        </p:nvCxnSpPr>
+        <p:spPr>
+          <a:xfrm flipH="1">
+            <a:off x="3019647" y="2179674"/>
+            <a:ext cx="3199503" cy="0"/>
+          </a:xfrm>
+          <a:prstGeom prst="line">
+            <a:avLst/>
+          </a:prstGeom>
+          <a:ln>
             <a:solidFill>
-              <a:srgbClr val="B4D0E7"/>
+              <a:schemeClr val="tx1"/>
             </a:solidFill>
-            <a:prstDash val="solid"/>
-            <a:round/>
-            <a:headEnd type="none" w="sm" len="sm"/>
-            <a:tailEnd type="none" w="sm" len="sm"/>
-          </a:ln>
-          <a:effectLst>
-            <a:outerShdw blurRad="57150" dist="19050" dir="5400000" algn="bl" rotWithShape="0">
-              <a:schemeClr val="dk1">
-                <a:alpha val="50000"/>
-              </a:schemeClr>
-            </a:outerShdw>
-          </a:effectLst>
-        </p:spPr>
-        <p:txBody>
-          <a:bodyPr spcFirstLastPara="1" wrap="square" lIns="91425" tIns="91425" rIns="91425" bIns="91425" anchor="ctr" anchorCtr="0">
-            <a:noAutofit/>
-          </a:bodyPr>
-          <a:lstStyle/>
-          <a:p>
-            <a:pPr marL="0" lvl="0" indent="0" algn="ctr" rtl="1">
-              <a:spcBef>
-                <a:spcPts val="0"/>
-              </a:spcBef>
-              <a:spcAft>
-                <a:spcPts val="0"/>
-              </a:spcAft>
-              <a:buNone/>
-            </a:pPr>
+          </a:ln>
+        </p:spPr>
+        <p:style>
+          <a:lnRef idx="1">
+            <a:schemeClr val="accent1"/>
+          </a:lnRef>
+          <a:fillRef idx="0">
+            <a:schemeClr val="accent1"/>
+          </a:fillRef>
+          <a:effectRef idx="0">
+            <a:schemeClr val="accent1"/>
+          </a:effectRef>
+          <a:fontRef idx="minor">
+            <a:schemeClr val="tx1"/>
+          </a:fontRef>
+        </p:style>
+      </p:cxnSp>
+      <p:sp>
+        <p:nvSpPr>
+          <p:cNvPr id="4" name="תיבת טקסט 3">
+            <a:extLst>
+              <a:ext uri="{FF2B5EF4-FFF2-40B4-BE49-F238E27FC236}">
+                <a16:creationId xmlns:a16="http://schemas.microsoft.com/office/drawing/2014/main" id="{D5B73526-97AD-4C4A-97F0-B4C7D1050650}"/>
+              </a:ext>
+            </a:extLst>
+          </p:cNvPr>
+          <p:cNvSpPr txBox="1"/>
+          <p:nvPr/>
+        </p:nvSpPr>
+        <p:spPr>
+          <a:xfrm>
+            <a:off x="4823085" y="1878560"/>
+            <a:ext cx="1179317" cy="307777"/>
+          </a:xfrm>
+          <a:prstGeom prst="rect">
+            <a:avLst/>
+          </a:prstGeom>
+          <a:noFill/>
+        </p:spPr>
+        <p:txBody>
+          <a:bodyPr wrap="square" rtlCol="1">
+            <a:spAutoFit/>
+          </a:bodyPr>
+          <a:lstStyle/>
+          <a:p>
+            <a:pPr algn="r"/>
             <a:r>
-              <a:rPr lang="iw">
+              <a:rPr lang="he-IL" dirty="0">
                 <a:solidFill>
-                  <a:srgbClr val="FFFFFF"/>
+                  <a:schemeClr val="bg1">
+                    <a:lumMod val="65000"/>
+                  </a:schemeClr>
                 </a:solidFill>
               </a:rPr>
-              <a:t>הרשמה</a:t>
+              <a:t>שם משתמש</a:t>
             </a:r>
-            <a:endParaRPr>
-              <a:solidFill>
-                <a:srgbClr val="FFFFFF"/>
-              </a:solidFill>
-            </a:endParaRPr>
+          </a:p>
+        </p:txBody>
+      </p:sp>
+      <p:pic>
+        <p:nvPicPr>
+          <p:cNvPr id="5" name="תמונה 4">
+            <a:extLst>
+              <a:ext uri="{FF2B5EF4-FFF2-40B4-BE49-F238E27FC236}">
+                <a16:creationId xmlns:a16="http://schemas.microsoft.com/office/drawing/2014/main" id="{6DA2EEF5-7B15-4308-8C82-78AF635EED88}"/>
+              </a:ext>
+            </a:extLst>
+          </p:cNvPr>
+          <p:cNvPicPr>
+            <a:picLocks noChangeAspect="1"/>
+          </p:cNvPicPr>
+          <p:nvPr/>
+        </p:nvPicPr>
+        <p:blipFill>
+          <a:blip r:embed="rId3"/>
+          <a:stretch>
+            <a:fillRect/>
+          </a:stretch>
+        </p:blipFill>
+        <p:spPr>
+          <a:xfrm>
+            <a:off x="6033383" y="1910662"/>
+            <a:ext cx="228600" cy="257175"/>
+          </a:xfrm>
+          <a:prstGeom prst="rect">
+            <a:avLst/>
+          </a:prstGeom>
+        </p:spPr>
+      </p:pic>
+      <p:cxnSp>
+        <p:nvCxnSpPr>
+          <p:cNvPr id="17" name="מחבר ישר 16">
+            <a:extLst>
+              <a:ext uri="{FF2B5EF4-FFF2-40B4-BE49-F238E27FC236}">
+                <a16:creationId xmlns:a16="http://schemas.microsoft.com/office/drawing/2014/main" id="{5D036B0E-F80E-47FB-AE96-7966891EC1F0}"/>
+              </a:ext>
+            </a:extLst>
+          </p:cNvPr>
+          <p:cNvCxnSpPr/>
+          <p:nvPr/>
+        </p:nvCxnSpPr>
+        <p:spPr>
+          <a:xfrm flipH="1">
+            <a:off x="3019646" y="2799907"/>
+            <a:ext cx="3199503" cy="0"/>
+          </a:xfrm>
+          <a:prstGeom prst="line">
+            <a:avLst/>
+          </a:prstGeom>
+          <a:ln>
+            <a:solidFill>
+              <a:schemeClr val="tx1"/>
+            </a:solidFill>
+          </a:ln>
+        </p:spPr>
+        <p:style>
+          <a:lnRef idx="1">
+            <a:schemeClr val="accent1"/>
+          </a:lnRef>
+          <a:fillRef idx="0">
+            <a:schemeClr val="accent1"/>
+          </a:fillRef>
+          <a:effectRef idx="0">
+            <a:schemeClr val="accent1"/>
+          </a:effectRef>
+          <a:fontRef idx="minor">
+            <a:schemeClr val="tx1"/>
+          </a:fontRef>
+        </p:style>
+      </p:cxnSp>
+      <p:pic>
+        <p:nvPicPr>
+          <p:cNvPr id="6" name="תמונה 5">
+            <a:extLst>
+              <a:ext uri="{FF2B5EF4-FFF2-40B4-BE49-F238E27FC236}">
+                <a16:creationId xmlns:a16="http://schemas.microsoft.com/office/drawing/2014/main" id="{2A51FD1F-2283-424E-AF24-27CEAE7A83C3}"/>
+              </a:ext>
+            </a:extLst>
+          </p:cNvPr>
+          <p:cNvPicPr>
+            <a:picLocks noChangeAspect="1"/>
+          </p:cNvPicPr>
+          <p:nvPr/>
+        </p:nvPicPr>
+        <p:blipFill>
+          <a:blip r:embed="rId4"/>
+          <a:stretch>
+            <a:fillRect/>
+          </a:stretch>
+        </p:blipFill>
+        <p:spPr>
+          <a:xfrm>
+            <a:off x="6028620" y="2519994"/>
+            <a:ext cx="233363" cy="257176"/>
+          </a:xfrm>
+          <a:prstGeom prst="rect">
+            <a:avLst/>
+          </a:prstGeom>
+        </p:spPr>
+      </p:pic>
+      <p:sp>
+        <p:nvSpPr>
+          <p:cNvPr id="21" name="תיבת טקסט 20">
+            <a:extLst>
+              <a:ext uri="{FF2B5EF4-FFF2-40B4-BE49-F238E27FC236}">
+                <a16:creationId xmlns:a16="http://schemas.microsoft.com/office/drawing/2014/main" id="{BE09BB2C-0E92-4E10-AD8A-CAA8858AA0EF}"/>
+              </a:ext>
+            </a:extLst>
+          </p:cNvPr>
+          <p:cNvSpPr txBox="1"/>
+          <p:nvPr/>
+        </p:nvSpPr>
+        <p:spPr>
+          <a:xfrm>
+            <a:off x="4823084" y="2498463"/>
+            <a:ext cx="1179317" cy="307777"/>
+          </a:xfrm>
+          <a:prstGeom prst="rect">
+            <a:avLst/>
+          </a:prstGeom>
+          <a:noFill/>
+        </p:spPr>
+        <p:txBody>
+          <a:bodyPr wrap="square" rtlCol="1">
+            <a:spAutoFit/>
+          </a:bodyPr>
+          <a:lstStyle/>
+          <a:p>
+            <a:pPr algn="r"/>
+            <a:r>
+              <a:rPr lang="he-IL" dirty="0">
+                <a:solidFill>
+                  <a:schemeClr val="bg1">
+                    <a:lumMod val="65000"/>
+                  </a:schemeClr>
+                </a:solidFill>
+              </a:rPr>
+              <a:t>סיסמה</a:t>
+            </a:r>
+          </a:p>
+        </p:txBody>
+      </p:sp>
+      <p:pic>
+        <p:nvPicPr>
+          <p:cNvPr id="9" name="תמונה 8">
+            <a:extLst>
+              <a:ext uri="{FF2B5EF4-FFF2-40B4-BE49-F238E27FC236}">
+                <a16:creationId xmlns:a16="http://schemas.microsoft.com/office/drawing/2014/main" id="{4BE0609B-506D-4B1E-B65D-B16B447523BC}"/>
+              </a:ext>
+            </a:extLst>
+          </p:cNvPr>
+          <p:cNvPicPr>
+            <a:picLocks noChangeAspect="1"/>
+          </p:cNvPicPr>
+          <p:nvPr/>
+        </p:nvPicPr>
+        <p:blipFill>
+          <a:blip r:embed="rId5"/>
+          <a:stretch>
+            <a:fillRect/>
+          </a:stretch>
+        </p:blipFill>
+        <p:spPr>
+          <a:xfrm>
+            <a:off x="3019646" y="2541337"/>
+            <a:ext cx="312906" cy="230832"/>
+          </a:xfrm>
+          <a:prstGeom prst="rect">
+            <a:avLst/>
+          </a:prstGeom>
+        </p:spPr>
+      </p:pic>
+      <p:sp>
+        <p:nvSpPr>
+          <p:cNvPr id="12" name="תיבת טקסט 11">
+            <a:extLst>
+              <a:ext uri="{FF2B5EF4-FFF2-40B4-BE49-F238E27FC236}">
+                <a16:creationId xmlns:a16="http://schemas.microsoft.com/office/drawing/2014/main" id="{6C13E352-83B7-4433-A4CE-18C2036E70B8}"/>
+              </a:ext>
+            </a:extLst>
+          </p:cNvPr>
+          <p:cNvSpPr txBox="1"/>
+          <p:nvPr/>
+        </p:nvSpPr>
+        <p:spPr>
+          <a:xfrm>
+            <a:off x="2673770" y="4147632"/>
+            <a:ext cx="1785251" cy="253916"/>
+          </a:xfrm>
+          <a:prstGeom prst="rect">
+            <a:avLst/>
+          </a:prstGeom>
+          <a:noFill/>
+        </p:spPr>
+        <p:txBody>
+          <a:bodyPr wrap="square" rtlCol="1">
+            <a:spAutoFit/>
+          </a:bodyPr>
+          <a:lstStyle/>
+          <a:p>
+            <a:pPr algn="r"/>
+            <a:r>
+              <a:rPr lang="he-IL" sz="1050" u="sng" dirty="0">
+                <a:solidFill>
+                  <a:srgbClr val="0000FF"/>
+                </a:solidFill>
+              </a:rPr>
+              <a:t>עוד לא נרשמת? הצטרף אלינו!</a:t>
+            </a:r>
+          </a:p>
+        </p:txBody>
+      </p:sp>
+      <p:pic>
+        <p:nvPicPr>
+          <p:cNvPr id="14" name="תמונה 13">
+            <a:extLst>
+              <a:ext uri="{FF2B5EF4-FFF2-40B4-BE49-F238E27FC236}">
+                <a16:creationId xmlns:a16="http://schemas.microsoft.com/office/drawing/2014/main" id="{0C17A21C-57CF-4D5A-ADA3-6C2290B1EDFF}"/>
+              </a:ext>
+            </a:extLst>
+          </p:cNvPr>
+          <p:cNvPicPr>
+            <a:picLocks noChangeAspect="1"/>
+          </p:cNvPicPr>
+          <p:nvPr/>
+        </p:nvPicPr>
+        <p:blipFill>
+          <a:blip r:embed="rId6"/>
+          <a:stretch>
+            <a:fillRect/>
+          </a:stretch>
+        </p:blipFill>
+        <p:spPr>
+          <a:xfrm>
+            <a:off x="6038174" y="3120145"/>
+            <a:ext cx="180975" cy="171450"/>
+          </a:xfrm>
+          <a:prstGeom prst="rect">
+            <a:avLst/>
+          </a:prstGeom>
+        </p:spPr>
+      </p:pic>
+      <p:sp>
+        <p:nvSpPr>
+          <p:cNvPr id="15" name="תיבת טקסט 14">
+            <a:extLst>
+              <a:ext uri="{FF2B5EF4-FFF2-40B4-BE49-F238E27FC236}">
+                <a16:creationId xmlns:a16="http://schemas.microsoft.com/office/drawing/2014/main" id="{D703060E-6D37-4D99-AD14-3288D408B318}"/>
+              </a:ext>
+            </a:extLst>
+          </p:cNvPr>
+          <p:cNvSpPr txBox="1"/>
+          <p:nvPr/>
+        </p:nvSpPr>
+        <p:spPr>
+          <a:xfrm>
+            <a:off x="4988211" y="3057113"/>
+            <a:ext cx="1014190" cy="307777"/>
+          </a:xfrm>
+          <a:prstGeom prst="rect">
+            <a:avLst/>
+          </a:prstGeom>
+          <a:noFill/>
+        </p:spPr>
+        <p:txBody>
+          <a:bodyPr wrap="square" rtlCol="1">
+            <a:spAutoFit/>
+          </a:bodyPr>
+          <a:lstStyle/>
+          <a:p>
+            <a:pPr algn="r"/>
+            <a:r>
+              <a:rPr lang="he-IL" dirty="0"/>
+              <a:t>זכור אותי</a:t>
+            </a:r>
+          </a:p>
+        </p:txBody>
+      </p:sp>
+      <p:sp>
+        <p:nvSpPr>
+          <p:cNvPr id="39" name="תיבת טקסט 38">
+            <a:extLst>
+              <a:ext uri="{FF2B5EF4-FFF2-40B4-BE49-F238E27FC236}">
+                <a16:creationId xmlns:a16="http://schemas.microsoft.com/office/drawing/2014/main" id="{05D77574-3F58-440F-8890-6998F9CE21C7}"/>
+              </a:ext>
+            </a:extLst>
+          </p:cNvPr>
+          <p:cNvSpPr txBox="1"/>
+          <p:nvPr/>
+        </p:nvSpPr>
+        <p:spPr>
+          <a:xfrm>
+            <a:off x="3019645" y="3092896"/>
+            <a:ext cx="1014190" cy="253916"/>
+          </a:xfrm>
+          <a:prstGeom prst="rect">
+            <a:avLst/>
+          </a:prstGeom>
+          <a:noFill/>
+        </p:spPr>
+        <p:txBody>
+          <a:bodyPr wrap="square" rtlCol="1">
+            <a:spAutoFit/>
+          </a:bodyPr>
+          <a:lstStyle/>
+          <a:p>
+            <a:pPr algn="r"/>
+            <a:r>
+              <a:rPr lang="he-IL" sz="1050" u="sng" dirty="0">
+                <a:solidFill>
+                  <a:srgbClr val="0000FF"/>
+                </a:solidFill>
+              </a:rPr>
+              <a:t>שכחת סיסמה?</a:t>
+            </a:r>
           </a:p>
         </p:txBody>
       </p:sp>

</xml_diff>

<commit_message>
start register evolution (not finished)
</commit_message>
<xml_diff>
--- a/ux_course/מסכים.pptx
+++ b/ux_course/מסכים.pptx
@@ -1274,7 +1274,7 @@
         </p:nvSpPr>
         <p:spPr>
           <a:xfrm>
-            <a:off x="381300" y="685800"/>
+            <a:off x="381000" y="685800"/>
             <a:ext cx="6096000" cy="3429000"/>
           </a:xfrm>
           <a:custGeom>
@@ -15621,216 +15621,24 @@
       </p:sp>
       <p:sp>
         <p:nvSpPr>
-          <p:cNvPr id="74" name="Google Shape;74;p14"/>
+          <p:cNvPr id="78" name="Google Shape;78;p14"/>
           <p:cNvSpPr/>
           <p:nvPr/>
         </p:nvSpPr>
         <p:spPr>
           <a:xfrm>
-            <a:off x="2897700" y="1049000"/>
-            <a:ext cx="3348600" cy="437400"/>
+            <a:off x="2795999" y="4375796"/>
+            <a:ext cx="1093500" cy="437400"/>
           </a:xfrm>
           <a:prstGeom prst="rect">
             <a:avLst/>
           </a:prstGeom>
           <a:solidFill>
-            <a:srgbClr val="FFFFFF"/>
+            <a:srgbClr val="1976D2"/>
           </a:solidFill>
           <a:ln w="9525" cap="flat" cmpd="sng">
             <a:solidFill>
-              <a:srgbClr val="B4D0E7"/>
-            </a:solidFill>
-            <a:prstDash val="solid"/>
-            <a:round/>
-            <a:headEnd type="none" w="sm" len="sm"/>
-            <a:tailEnd type="none" w="sm" len="sm"/>
-          </a:ln>
-        </p:spPr>
-        <p:txBody>
-          <a:bodyPr spcFirstLastPara="1" wrap="square" lIns="91425" tIns="91425" rIns="91425" bIns="91425" anchor="ctr" anchorCtr="0">
-            <a:noAutofit/>
-          </a:bodyPr>
-          <a:lstStyle/>
-          <a:p>
-            <a:pPr marL="0" lvl="0" indent="0" algn="l" rtl="0">
-              <a:spcBef>
-                <a:spcPts val="0"/>
-              </a:spcBef>
-              <a:spcAft>
-                <a:spcPts val="0"/>
-              </a:spcAft>
-              <a:buNone/>
-            </a:pPr>
-            <a:endParaRPr/>
-          </a:p>
-        </p:txBody>
-      </p:sp>
-      <p:sp>
-        <p:nvSpPr>
-          <p:cNvPr id="75" name="Google Shape;75;p14"/>
-          <p:cNvSpPr txBox="1"/>
-          <p:nvPr/>
-        </p:nvSpPr>
-        <p:spPr>
-          <a:xfrm>
-            <a:off x="4770000" y="1049000"/>
-            <a:ext cx="1476300" cy="437400"/>
-          </a:xfrm>
-          <a:prstGeom prst="rect">
-            <a:avLst/>
-          </a:prstGeom>
-          <a:noFill/>
-          <a:ln>
-            <a:noFill/>
-          </a:ln>
-        </p:spPr>
-        <p:txBody>
-          <a:bodyPr spcFirstLastPara="1" wrap="square" lIns="91425" tIns="91425" rIns="91425" bIns="91425" anchor="t" anchorCtr="0">
-            <a:noAutofit/>
-          </a:bodyPr>
-          <a:lstStyle/>
-          <a:p>
-            <a:pPr marL="0" lvl="0" indent="0" algn="r" rtl="1">
-              <a:spcBef>
-                <a:spcPts val="0"/>
-              </a:spcBef>
-              <a:spcAft>
-                <a:spcPts val="0"/>
-              </a:spcAft>
-              <a:buNone/>
-            </a:pPr>
-            <a:r>
-              <a:rPr lang="iw">
-                <a:solidFill>
-                  <a:srgbClr val="999999"/>
-                </a:solidFill>
-              </a:rPr>
-              <a:t>שם משתמש</a:t>
-            </a:r>
-            <a:endParaRPr>
-              <a:solidFill>
-                <a:srgbClr val="999999"/>
-              </a:solidFill>
-            </a:endParaRPr>
-          </a:p>
-        </p:txBody>
-      </p:sp>
-      <p:sp>
-        <p:nvSpPr>
-          <p:cNvPr id="76" name="Google Shape;76;p14"/>
-          <p:cNvSpPr/>
-          <p:nvPr/>
-        </p:nvSpPr>
-        <p:spPr>
-          <a:xfrm>
-            <a:off x="2897700" y="2292500"/>
-            <a:ext cx="3348600" cy="437400"/>
-          </a:xfrm>
-          <a:prstGeom prst="rect">
-            <a:avLst/>
-          </a:prstGeom>
-          <a:solidFill>
-            <a:srgbClr val="FFFFFF"/>
-          </a:solidFill>
-          <a:ln w="9525" cap="flat" cmpd="sng">
-            <a:solidFill>
-              <a:srgbClr val="B4D0E7"/>
-            </a:solidFill>
-            <a:prstDash val="solid"/>
-            <a:round/>
-            <a:headEnd type="none" w="sm" len="sm"/>
-            <a:tailEnd type="none" w="sm" len="sm"/>
-          </a:ln>
-        </p:spPr>
-        <p:txBody>
-          <a:bodyPr spcFirstLastPara="1" wrap="square" lIns="91425" tIns="91425" rIns="91425" bIns="91425" anchor="ctr" anchorCtr="0">
-            <a:noAutofit/>
-          </a:bodyPr>
-          <a:lstStyle/>
-          <a:p>
-            <a:pPr marL="0" lvl="0" indent="0" algn="l" rtl="0">
-              <a:spcBef>
-                <a:spcPts val="0"/>
-              </a:spcBef>
-              <a:spcAft>
-                <a:spcPts val="0"/>
-              </a:spcAft>
-              <a:buNone/>
-            </a:pPr>
-            <a:endParaRPr/>
-          </a:p>
-        </p:txBody>
-      </p:sp>
-      <p:sp>
-        <p:nvSpPr>
-          <p:cNvPr id="77" name="Google Shape;77;p14"/>
-          <p:cNvSpPr txBox="1"/>
-          <p:nvPr/>
-        </p:nvSpPr>
-        <p:spPr>
-          <a:xfrm>
-            <a:off x="4701900" y="2292500"/>
-            <a:ext cx="1476300" cy="437400"/>
-          </a:xfrm>
-          <a:prstGeom prst="rect">
-            <a:avLst/>
-          </a:prstGeom>
-          <a:noFill/>
-          <a:ln>
-            <a:noFill/>
-          </a:ln>
-        </p:spPr>
-        <p:txBody>
-          <a:bodyPr spcFirstLastPara="1" wrap="square" lIns="91425" tIns="91425" rIns="91425" bIns="91425" anchor="t" anchorCtr="0">
-            <a:noAutofit/>
-          </a:bodyPr>
-          <a:lstStyle/>
-          <a:p>
-            <a:pPr marL="0" lvl="0" indent="0" algn="r" rtl="1">
-              <a:spcBef>
-                <a:spcPts val="0"/>
-              </a:spcBef>
-              <a:spcAft>
-                <a:spcPts val="0"/>
-              </a:spcAft>
-              <a:buNone/>
-            </a:pPr>
-            <a:r>
-              <a:rPr lang="iw">
-                <a:solidFill>
-                  <a:srgbClr val="999999"/>
-                </a:solidFill>
-              </a:rPr>
-              <a:t>אימייל</a:t>
-            </a:r>
-            <a:endParaRPr>
-              <a:solidFill>
-                <a:srgbClr val="999999"/>
-              </a:solidFill>
-            </a:endParaRPr>
-          </a:p>
-        </p:txBody>
-      </p:sp>
-      <p:sp>
-        <p:nvSpPr>
-          <p:cNvPr id="78" name="Google Shape;78;p14"/>
-          <p:cNvSpPr/>
-          <p:nvPr/>
-        </p:nvSpPr>
-        <p:spPr>
-          <a:xfrm>
-            <a:off x="5152950" y="4384050"/>
-            <a:ext cx="1093500" cy="437400"/>
-          </a:xfrm>
-          <a:prstGeom prst="rect">
-            <a:avLst/>
-          </a:prstGeom>
-          <a:solidFill>
-            <a:srgbClr val="B4D0E7"/>
-          </a:solidFill>
-          <a:ln w="9525" cap="flat" cmpd="sng">
-            <a:solidFill>
-              <a:srgbClr val="B4D0E7"/>
+              <a:srgbClr val="1976D2"/>
             </a:solidFill>
             <a:prstDash val="solid"/>
             <a:round/>
@@ -15861,14 +15669,14 @@
               <a:buNone/>
             </a:pPr>
             <a:r>
-              <a:rPr lang="iw">
+              <a:rPr lang="iw" dirty="0">
                 <a:solidFill>
                   <a:srgbClr val="FFFFFF"/>
                 </a:solidFill>
               </a:rPr>
               <a:t>הירשם</a:t>
             </a:r>
-            <a:endParaRPr>
+            <a:endParaRPr dirty="0">
               <a:solidFill>
                 <a:srgbClr val="FFFFFF"/>
               </a:solidFill>
@@ -15878,369 +15686,1097 @@
       </p:sp>
       <p:sp>
         <p:nvSpPr>
-          <p:cNvPr id="79" name="Google Shape;79;p14"/>
-          <p:cNvSpPr/>
-          <p:nvPr/>
-        </p:nvSpPr>
-        <p:spPr>
-          <a:xfrm>
-            <a:off x="2897700" y="1670750"/>
-            <a:ext cx="3348600" cy="437400"/>
-          </a:xfrm>
-          <a:prstGeom prst="rect">
-            <a:avLst/>
-          </a:prstGeom>
-          <a:solidFill>
-            <a:srgbClr val="FFFFFF"/>
-          </a:solidFill>
-          <a:ln w="9525" cap="flat" cmpd="sng">
-            <a:solidFill>
-              <a:srgbClr val="B4D0E7"/>
-            </a:solidFill>
-            <a:prstDash val="solid"/>
-            <a:round/>
-            <a:headEnd type="none" w="sm" len="sm"/>
-            <a:tailEnd type="none" w="sm" len="sm"/>
-          </a:ln>
-        </p:spPr>
-        <p:txBody>
-          <a:bodyPr spcFirstLastPara="1" wrap="square" lIns="91425" tIns="91425" rIns="91425" bIns="91425" anchor="ctr" anchorCtr="0">
-            <a:noAutofit/>
-          </a:bodyPr>
-          <a:lstStyle/>
-          <a:p>
-            <a:pPr marL="0" lvl="0" indent="0" algn="l" rtl="0">
-              <a:spcBef>
-                <a:spcPts val="0"/>
-              </a:spcBef>
-              <a:spcAft>
-                <a:spcPts val="0"/>
-              </a:spcAft>
-              <a:buNone/>
-            </a:pPr>
-            <a:endParaRPr/>
-          </a:p>
-        </p:txBody>
-      </p:sp>
-      <p:sp>
-        <p:nvSpPr>
-          <p:cNvPr id="80" name="Google Shape;80;p14"/>
+          <p:cNvPr id="21" name="תיבת טקסט 20">
+            <a:extLst>
+              <a:ext uri="{FF2B5EF4-FFF2-40B4-BE49-F238E27FC236}">
+                <a16:creationId xmlns:a16="http://schemas.microsoft.com/office/drawing/2014/main" id="{999FDD59-B2DE-47D7-A9AA-D4ABFEBBBDFF}"/>
+              </a:ext>
+            </a:extLst>
+          </p:cNvPr>
           <p:cNvSpPr txBox="1"/>
           <p:nvPr/>
         </p:nvSpPr>
         <p:spPr>
           <a:xfrm>
-            <a:off x="4701900" y="1670750"/>
-            <a:ext cx="1476300" cy="437400"/>
+            <a:off x="4776254" y="1024822"/>
+            <a:ext cx="1179317" cy="307777"/>
           </a:xfrm>
           <a:prstGeom prst="rect">
             <a:avLst/>
           </a:prstGeom>
           <a:noFill/>
-          <a:ln>
-            <a:noFill/>
-          </a:ln>
-        </p:spPr>
-        <p:txBody>
-          <a:bodyPr spcFirstLastPara="1" wrap="square" lIns="91425" tIns="91425" rIns="91425" bIns="91425" anchor="t" anchorCtr="0">
-            <a:noAutofit/>
-          </a:bodyPr>
-          <a:lstStyle/>
-          <a:p>
-            <a:pPr marL="0" lvl="0" indent="0" algn="r" rtl="1">
-              <a:spcBef>
-                <a:spcPts val="0"/>
-              </a:spcBef>
-              <a:spcAft>
-                <a:spcPts val="0"/>
-              </a:spcAft>
-              <a:buNone/>
-            </a:pPr>
+        </p:spPr>
+        <p:txBody>
+          <a:bodyPr wrap="square" rtlCol="1">
+            <a:spAutoFit/>
+          </a:bodyPr>
+          <a:lstStyle/>
+          <a:p>
+            <a:pPr algn="r"/>
             <a:r>
-              <a:rPr lang="iw">
+              <a:rPr lang="he-IL" dirty="0">
                 <a:solidFill>
-                  <a:srgbClr val="999999"/>
+                  <a:schemeClr val="bg1">
+                    <a:lumMod val="65000"/>
+                  </a:schemeClr>
                 </a:solidFill>
               </a:rPr>
-              <a:t>סיסמא</a:t>
+              <a:t>שם משתמש</a:t>
             </a:r>
-            <a:endParaRPr>
-              <a:solidFill>
-                <a:srgbClr val="999999"/>
-              </a:solidFill>
-            </a:endParaRPr>
-          </a:p>
-        </p:txBody>
-      </p:sp>
-      <p:sp>
-        <p:nvSpPr>
-          <p:cNvPr id="81" name="Google Shape;81;p14"/>
-          <p:cNvSpPr/>
-          <p:nvPr/>
-        </p:nvSpPr>
-        <p:spPr>
-          <a:xfrm>
-            <a:off x="2897700" y="2981800"/>
-            <a:ext cx="3348600" cy="437400"/>
-          </a:xfrm>
-          <a:prstGeom prst="rect">
-            <a:avLst/>
-          </a:prstGeom>
-          <a:solidFill>
-            <a:srgbClr val="FFFFFF"/>
-          </a:solidFill>
-          <a:ln w="9525" cap="flat" cmpd="sng">
+          </a:p>
+        </p:txBody>
+      </p:sp>
+      <p:pic>
+        <p:nvPicPr>
+          <p:cNvPr id="22" name="תמונה 21">
+            <a:extLst>
+              <a:ext uri="{FF2B5EF4-FFF2-40B4-BE49-F238E27FC236}">
+                <a16:creationId xmlns:a16="http://schemas.microsoft.com/office/drawing/2014/main" id="{E91DF085-307D-4053-9376-CEA14D57036E}"/>
+              </a:ext>
+            </a:extLst>
+          </p:cNvPr>
+          <p:cNvPicPr>
+            <a:picLocks noChangeAspect="1"/>
+          </p:cNvPicPr>
+          <p:nvPr/>
+        </p:nvPicPr>
+        <p:blipFill>
+          <a:blip r:embed="rId3"/>
+          <a:stretch>
+            <a:fillRect/>
+          </a:stretch>
+        </p:blipFill>
+        <p:spPr>
+          <a:xfrm>
+            <a:off x="5986552" y="1056924"/>
+            <a:ext cx="228600" cy="257175"/>
+          </a:xfrm>
+          <a:prstGeom prst="rect">
+            <a:avLst/>
+          </a:prstGeom>
+        </p:spPr>
+      </p:pic>
+      <p:cxnSp>
+        <p:nvCxnSpPr>
+          <p:cNvPr id="23" name="מחבר ישר 22">
+            <a:extLst>
+              <a:ext uri="{FF2B5EF4-FFF2-40B4-BE49-F238E27FC236}">
+                <a16:creationId xmlns:a16="http://schemas.microsoft.com/office/drawing/2014/main" id="{0AB917D7-8D1D-4707-BE40-434ABA1DA5E6}"/>
+              </a:ext>
+            </a:extLst>
+          </p:cNvPr>
+          <p:cNvCxnSpPr/>
+          <p:nvPr/>
+        </p:nvCxnSpPr>
+        <p:spPr>
+          <a:xfrm flipH="1">
+            <a:off x="3003797" y="1894183"/>
+            <a:ext cx="3199503" cy="0"/>
+          </a:xfrm>
+          <a:prstGeom prst="line">
+            <a:avLst/>
+          </a:prstGeom>
+          <a:ln>
             <a:solidFill>
-              <a:srgbClr val="B4D0E7"/>
+              <a:schemeClr val="tx1"/>
             </a:solidFill>
-            <a:prstDash val="solid"/>
-            <a:round/>
-            <a:headEnd type="none" w="sm" len="sm"/>
-            <a:tailEnd type="none" w="sm" len="sm"/>
-          </a:ln>
-        </p:spPr>
-        <p:txBody>
-          <a:bodyPr spcFirstLastPara="1" wrap="square" lIns="91425" tIns="91425" rIns="91425" bIns="91425" anchor="ctr" anchorCtr="0">
-            <a:noAutofit/>
-          </a:bodyPr>
-          <a:lstStyle/>
-          <a:p>
-            <a:pPr marL="0" lvl="0" indent="0" algn="l" rtl="0">
-              <a:spcBef>
-                <a:spcPts val="0"/>
-              </a:spcBef>
-              <a:spcAft>
-                <a:spcPts val="0"/>
-              </a:spcAft>
-              <a:buNone/>
-            </a:pPr>
-            <a:endParaRPr/>
-          </a:p>
-        </p:txBody>
-      </p:sp>
-      <p:sp>
-        <p:nvSpPr>
-          <p:cNvPr id="82" name="Google Shape;82;p14"/>
+          </a:ln>
+        </p:spPr>
+        <p:style>
+          <a:lnRef idx="1">
+            <a:schemeClr val="accent1"/>
+          </a:lnRef>
+          <a:fillRef idx="0">
+            <a:schemeClr val="accent1"/>
+          </a:fillRef>
+          <a:effectRef idx="0">
+            <a:schemeClr val="accent1"/>
+          </a:effectRef>
+          <a:fontRef idx="minor">
+            <a:schemeClr val="tx1"/>
+          </a:fontRef>
+        </p:style>
+      </p:cxnSp>
+      <p:pic>
+        <p:nvPicPr>
+          <p:cNvPr id="24" name="תמונה 23">
+            <a:extLst>
+              <a:ext uri="{FF2B5EF4-FFF2-40B4-BE49-F238E27FC236}">
+                <a16:creationId xmlns:a16="http://schemas.microsoft.com/office/drawing/2014/main" id="{C2A72332-1E1F-462F-959D-49BE978C44D3}"/>
+              </a:ext>
+            </a:extLst>
+          </p:cNvPr>
+          <p:cNvPicPr>
+            <a:picLocks noChangeAspect="1"/>
+          </p:cNvPicPr>
+          <p:nvPr/>
+        </p:nvPicPr>
+        <p:blipFill>
+          <a:blip r:embed="rId4"/>
+          <a:stretch>
+            <a:fillRect/>
+          </a:stretch>
+        </p:blipFill>
+        <p:spPr>
+          <a:xfrm>
+            <a:off x="6012771" y="1614270"/>
+            <a:ext cx="233363" cy="257176"/>
+          </a:xfrm>
+          <a:prstGeom prst="rect">
+            <a:avLst/>
+          </a:prstGeom>
+        </p:spPr>
+      </p:pic>
+      <p:sp>
+        <p:nvSpPr>
+          <p:cNvPr id="25" name="תיבת טקסט 24">
+            <a:extLst>
+              <a:ext uri="{FF2B5EF4-FFF2-40B4-BE49-F238E27FC236}">
+                <a16:creationId xmlns:a16="http://schemas.microsoft.com/office/drawing/2014/main" id="{B607CE7D-DA7B-45FE-A543-08D441813EB4}"/>
+              </a:ext>
+            </a:extLst>
+          </p:cNvPr>
           <p:cNvSpPr txBox="1"/>
           <p:nvPr/>
         </p:nvSpPr>
         <p:spPr>
           <a:xfrm>
-            <a:off x="4701900" y="2981800"/>
-            <a:ext cx="1476300" cy="437400"/>
+            <a:off x="4807235" y="1592739"/>
+            <a:ext cx="1179317" cy="307777"/>
           </a:xfrm>
           <a:prstGeom prst="rect">
             <a:avLst/>
           </a:prstGeom>
           <a:noFill/>
+        </p:spPr>
+        <p:txBody>
+          <a:bodyPr wrap="square" rtlCol="1">
+            <a:spAutoFit/>
+          </a:bodyPr>
+          <a:lstStyle/>
+          <a:p>
+            <a:pPr algn="r"/>
+            <a:r>
+              <a:rPr lang="he-IL" dirty="0">
+                <a:solidFill>
+                  <a:schemeClr val="bg1">
+                    <a:lumMod val="65000"/>
+                  </a:schemeClr>
+                </a:solidFill>
+              </a:rPr>
+              <a:t>סיסמה</a:t>
+            </a:r>
+          </a:p>
+        </p:txBody>
+      </p:sp>
+      <p:cxnSp>
+        <p:nvCxnSpPr>
+          <p:cNvPr id="26" name="מחבר ישר 25">
+            <a:extLst>
+              <a:ext uri="{FF2B5EF4-FFF2-40B4-BE49-F238E27FC236}">
+                <a16:creationId xmlns:a16="http://schemas.microsoft.com/office/drawing/2014/main" id="{04D6BC42-62A4-4B9E-9C27-6287334132B5}"/>
+              </a:ext>
+            </a:extLst>
+          </p:cNvPr>
+          <p:cNvCxnSpPr/>
+          <p:nvPr/>
+        </p:nvCxnSpPr>
+        <p:spPr>
+          <a:xfrm flipH="1">
+            <a:off x="3021221" y="2524164"/>
+            <a:ext cx="3199503" cy="0"/>
+          </a:xfrm>
+          <a:prstGeom prst="line">
+            <a:avLst/>
+          </a:prstGeom>
           <a:ln>
-            <a:noFill/>
-          </a:ln>
-        </p:spPr>
-        <p:txBody>
-          <a:bodyPr spcFirstLastPara="1" wrap="square" lIns="91425" tIns="91425" rIns="91425" bIns="91425" anchor="t" anchorCtr="0">
-            <a:noAutofit/>
-          </a:bodyPr>
-          <a:lstStyle/>
-          <a:p>
-            <a:pPr marL="0" lvl="0" indent="0" algn="r" rtl="1">
-              <a:spcBef>
-                <a:spcPts val="0"/>
-              </a:spcBef>
-              <a:spcAft>
-                <a:spcPts val="0"/>
-              </a:spcAft>
-              <a:buNone/>
-            </a:pPr>
+            <a:solidFill>
+              <a:schemeClr val="tx1"/>
+            </a:solidFill>
+          </a:ln>
+        </p:spPr>
+        <p:style>
+          <a:lnRef idx="1">
+            <a:schemeClr val="accent1"/>
+          </a:lnRef>
+          <a:fillRef idx="0">
+            <a:schemeClr val="accent1"/>
+          </a:fillRef>
+          <a:effectRef idx="0">
+            <a:schemeClr val="accent1"/>
+          </a:effectRef>
+          <a:fontRef idx="minor">
+            <a:schemeClr val="tx1"/>
+          </a:fontRef>
+        </p:style>
+      </p:cxnSp>
+      <p:sp>
+        <p:nvSpPr>
+          <p:cNvPr id="28" name="תיבת טקסט 27">
+            <a:extLst>
+              <a:ext uri="{FF2B5EF4-FFF2-40B4-BE49-F238E27FC236}">
+                <a16:creationId xmlns:a16="http://schemas.microsoft.com/office/drawing/2014/main" id="{2AB7A8A8-474F-4485-B4C8-738E220C3840}"/>
+              </a:ext>
+            </a:extLst>
+          </p:cNvPr>
+          <p:cNvSpPr txBox="1"/>
+          <p:nvPr/>
+        </p:nvSpPr>
+        <p:spPr>
+          <a:xfrm>
+            <a:off x="4824659" y="2222720"/>
+            <a:ext cx="1179317" cy="307777"/>
+          </a:xfrm>
+          <a:prstGeom prst="rect">
+            <a:avLst/>
+          </a:prstGeom>
+          <a:noFill/>
+        </p:spPr>
+        <p:txBody>
+          <a:bodyPr wrap="square" rtlCol="1">
+            <a:spAutoFit/>
+          </a:bodyPr>
+          <a:lstStyle/>
+          <a:p>
+            <a:pPr algn="r"/>
             <a:r>
-              <a:rPr lang="iw">
+              <a:rPr lang="he-IL" dirty="0">
                 <a:solidFill>
-                  <a:srgbClr val="999999"/>
+                  <a:schemeClr val="bg1">
+                    <a:lumMod val="65000"/>
+                  </a:schemeClr>
+                </a:solidFill>
+              </a:rPr>
+              <a:t>אימייל</a:t>
+            </a:r>
+          </a:p>
+        </p:txBody>
+      </p:sp>
+      <p:cxnSp>
+        <p:nvCxnSpPr>
+          <p:cNvPr id="29" name="מחבר ישר 28">
+            <a:extLst>
+              <a:ext uri="{FF2B5EF4-FFF2-40B4-BE49-F238E27FC236}">
+                <a16:creationId xmlns:a16="http://schemas.microsoft.com/office/drawing/2014/main" id="{2ED1B3AF-5F3F-4474-BAC1-C4CC8323C8BC}"/>
+              </a:ext>
+            </a:extLst>
+          </p:cNvPr>
+          <p:cNvCxnSpPr/>
+          <p:nvPr/>
+        </p:nvCxnSpPr>
+        <p:spPr>
+          <a:xfrm flipH="1">
+            <a:off x="3021221" y="3127053"/>
+            <a:ext cx="3199503" cy="0"/>
+          </a:xfrm>
+          <a:prstGeom prst="line">
+            <a:avLst/>
+          </a:prstGeom>
+          <a:ln>
+            <a:solidFill>
+              <a:schemeClr val="tx1"/>
+            </a:solidFill>
+          </a:ln>
+        </p:spPr>
+        <p:style>
+          <a:lnRef idx="1">
+            <a:schemeClr val="accent1"/>
+          </a:lnRef>
+          <a:fillRef idx="0">
+            <a:schemeClr val="accent1"/>
+          </a:fillRef>
+          <a:effectRef idx="0">
+            <a:schemeClr val="accent1"/>
+          </a:effectRef>
+          <a:fontRef idx="minor">
+            <a:schemeClr val="tx1"/>
+          </a:fontRef>
+        </p:style>
+      </p:cxnSp>
+      <p:sp>
+        <p:nvSpPr>
+          <p:cNvPr id="31" name="תיבת טקסט 30">
+            <a:extLst>
+              <a:ext uri="{FF2B5EF4-FFF2-40B4-BE49-F238E27FC236}">
+                <a16:creationId xmlns:a16="http://schemas.microsoft.com/office/drawing/2014/main" id="{1D46B478-34D2-4ECC-8708-8D4633F9AE84}"/>
+              </a:ext>
+            </a:extLst>
+          </p:cNvPr>
+          <p:cNvSpPr txBox="1"/>
+          <p:nvPr/>
+        </p:nvSpPr>
+        <p:spPr>
+          <a:xfrm>
+            <a:off x="4824659" y="2825609"/>
+            <a:ext cx="1179317" cy="307777"/>
+          </a:xfrm>
+          <a:prstGeom prst="rect">
+            <a:avLst/>
+          </a:prstGeom>
+          <a:noFill/>
+        </p:spPr>
+        <p:txBody>
+          <a:bodyPr wrap="square" rtlCol="1">
+            <a:spAutoFit/>
+          </a:bodyPr>
+          <a:lstStyle/>
+          <a:p>
+            <a:pPr algn="r"/>
+            <a:r>
+              <a:rPr lang="he-IL" dirty="0">
+                <a:solidFill>
+                  <a:schemeClr val="bg1">
+                    <a:lumMod val="65000"/>
+                  </a:schemeClr>
                 </a:solidFill>
               </a:rPr>
               <a:t>כתובת</a:t>
             </a:r>
-            <a:endParaRPr>
-              <a:solidFill>
-                <a:srgbClr val="999999"/>
-              </a:solidFill>
-            </a:endParaRPr>
-          </a:p>
-        </p:txBody>
-      </p:sp>
-      <p:sp>
-        <p:nvSpPr>
-          <p:cNvPr id="83" name="Google Shape;83;p14"/>
-          <p:cNvSpPr/>
-          <p:nvPr/>
-        </p:nvSpPr>
-        <p:spPr>
-          <a:xfrm>
-            <a:off x="6123325" y="3672175"/>
-            <a:ext cx="123000" cy="123000"/>
-          </a:xfrm>
-          <a:prstGeom prst="flowChartConnector">
-            <a:avLst/>
-          </a:prstGeom>
-          <a:solidFill>
-            <a:srgbClr val="FFFFFF"/>
-          </a:solidFill>
-          <a:ln w="9525" cap="flat" cmpd="sng">
-            <a:solidFill>
-              <a:srgbClr val="000000"/>
-            </a:solidFill>
-            <a:prstDash val="solid"/>
-            <a:round/>
-            <a:headEnd type="none" w="sm" len="sm"/>
-            <a:tailEnd type="none" w="sm" len="sm"/>
-          </a:ln>
-        </p:spPr>
-        <p:txBody>
-          <a:bodyPr spcFirstLastPara="1" wrap="square" lIns="91425" tIns="91425" rIns="91425" bIns="91425" anchor="ctr" anchorCtr="0">
-            <a:noAutofit/>
-          </a:bodyPr>
-          <a:lstStyle/>
-          <a:p>
-            <a:pPr marL="0" lvl="0" indent="0" algn="l" rtl="0">
-              <a:spcBef>
-                <a:spcPts val="0"/>
-              </a:spcBef>
-              <a:spcAft>
-                <a:spcPts val="0"/>
-              </a:spcAft>
-              <a:buNone/>
-            </a:pPr>
-            <a:endParaRPr/>
-          </a:p>
-        </p:txBody>
-      </p:sp>
-      <p:sp>
-        <p:nvSpPr>
-          <p:cNvPr id="84" name="Google Shape;84;p14"/>
+          </a:p>
+        </p:txBody>
+      </p:sp>
+      <p:pic>
+        <p:nvPicPr>
+          <p:cNvPr id="2" name="תמונה 1">
+            <a:extLst>
+              <a:ext uri="{FF2B5EF4-FFF2-40B4-BE49-F238E27FC236}">
+                <a16:creationId xmlns:a16="http://schemas.microsoft.com/office/drawing/2014/main" id="{9C81B53C-BA51-4D33-8883-4D686618CDA7}"/>
+              </a:ext>
+            </a:extLst>
+          </p:cNvPr>
+          <p:cNvPicPr>
+            <a:picLocks noChangeAspect="1"/>
+          </p:cNvPicPr>
+          <p:nvPr/>
+        </p:nvPicPr>
+        <p:blipFill>
+          <a:blip r:embed="rId5"/>
+          <a:stretch>
+            <a:fillRect/>
+          </a:stretch>
+        </p:blipFill>
+        <p:spPr>
+          <a:xfrm>
+            <a:off x="6015355" y="2296798"/>
+            <a:ext cx="215939" cy="167353"/>
+          </a:xfrm>
+          <a:prstGeom prst="rect">
+            <a:avLst/>
+          </a:prstGeom>
+        </p:spPr>
+      </p:pic>
+      <p:pic>
+        <p:nvPicPr>
+          <p:cNvPr id="3" name="תמונה 2">
+            <a:extLst>
+              <a:ext uri="{FF2B5EF4-FFF2-40B4-BE49-F238E27FC236}">
+                <a16:creationId xmlns:a16="http://schemas.microsoft.com/office/drawing/2014/main" id="{BA2E44E3-9222-496D-8C21-8799AFF7069C}"/>
+              </a:ext>
+            </a:extLst>
+          </p:cNvPr>
+          <p:cNvPicPr>
+            <a:picLocks noChangeAspect="1"/>
+          </p:cNvPicPr>
+          <p:nvPr/>
+        </p:nvPicPr>
+        <p:blipFill>
+          <a:blip r:embed="rId6"/>
+          <a:stretch>
+            <a:fillRect/>
+          </a:stretch>
+        </p:blipFill>
+        <p:spPr>
+          <a:xfrm>
+            <a:off x="5992455" y="2845348"/>
+            <a:ext cx="231174" cy="242451"/>
+          </a:xfrm>
+          <a:prstGeom prst="rect">
+            <a:avLst/>
+          </a:prstGeom>
+        </p:spPr>
+      </p:pic>
+      <p:sp>
+        <p:nvSpPr>
+          <p:cNvPr id="35" name="תיבת טקסט 34">
+            <a:extLst>
+              <a:ext uri="{FF2B5EF4-FFF2-40B4-BE49-F238E27FC236}">
+                <a16:creationId xmlns:a16="http://schemas.microsoft.com/office/drawing/2014/main" id="{80245655-6D19-4518-98D1-ED31C1BA1F57}"/>
+              </a:ext>
+            </a:extLst>
+          </p:cNvPr>
           <p:cNvSpPr txBox="1"/>
           <p:nvPr/>
         </p:nvSpPr>
         <p:spPr>
           <a:xfrm>
-            <a:off x="5282850" y="3536000"/>
-            <a:ext cx="833700" cy="393600"/>
+            <a:off x="5784112" y="3291978"/>
+            <a:ext cx="505246" cy="307777"/>
           </a:xfrm>
           <a:prstGeom prst="rect">
             <a:avLst/>
           </a:prstGeom>
           <a:noFill/>
-          <a:ln>
-            <a:noFill/>
-          </a:ln>
-        </p:spPr>
-        <p:txBody>
-          <a:bodyPr spcFirstLastPara="1" wrap="square" lIns="91425" tIns="91425" rIns="91425" bIns="91425" anchor="t" anchorCtr="0">
-            <a:noAutofit/>
-          </a:bodyPr>
-          <a:lstStyle/>
-          <a:p>
-            <a:pPr marL="0" lvl="0" indent="0" algn="r" rtl="1">
-              <a:spcBef>
-                <a:spcPts val="0"/>
-              </a:spcBef>
-              <a:spcAft>
-                <a:spcPts val="0"/>
-              </a:spcAft>
-              <a:buNone/>
-            </a:pPr>
+        </p:spPr>
+        <p:txBody>
+          <a:bodyPr wrap="square" rtlCol="1">
+            <a:spAutoFit/>
+          </a:bodyPr>
+          <a:lstStyle/>
+          <a:p>
+            <a:pPr algn="r"/>
             <a:r>
-              <a:rPr lang="iw"/>
+              <a:rPr lang="he-IL" dirty="0">
+                <a:solidFill>
+                  <a:schemeClr val="bg1">
+                    <a:lumMod val="65000"/>
+                  </a:schemeClr>
+                </a:solidFill>
+              </a:rPr>
+              <a:t>מין :</a:t>
+            </a:r>
+          </a:p>
+        </p:txBody>
+      </p:sp>
+      <p:sp>
+        <p:nvSpPr>
+          <p:cNvPr id="36" name="תיבת טקסט 35">
+            <a:extLst>
+              <a:ext uri="{FF2B5EF4-FFF2-40B4-BE49-F238E27FC236}">
+                <a16:creationId xmlns:a16="http://schemas.microsoft.com/office/drawing/2014/main" id="{3517E6CE-67E1-43EC-BAFC-50C9575A4EC6}"/>
+              </a:ext>
+            </a:extLst>
+          </p:cNvPr>
+          <p:cNvSpPr txBox="1"/>
+          <p:nvPr/>
+        </p:nvSpPr>
+        <p:spPr>
+          <a:xfrm>
+            <a:off x="5029950" y="3308460"/>
+            <a:ext cx="505246" cy="307777"/>
+          </a:xfrm>
+          <a:prstGeom prst="rect">
+            <a:avLst/>
+          </a:prstGeom>
+          <a:noFill/>
+        </p:spPr>
+        <p:txBody>
+          <a:bodyPr wrap="square" rtlCol="1">
+            <a:spAutoFit/>
+          </a:bodyPr>
+          <a:lstStyle/>
+          <a:p>
+            <a:pPr algn="r"/>
+            <a:r>
+              <a:rPr lang="he-IL" dirty="0">
+                <a:solidFill>
+                  <a:schemeClr val="bg1">
+                    <a:lumMod val="65000"/>
+                  </a:schemeClr>
+                </a:solidFill>
+              </a:rPr>
               <a:t>זכר</a:t>
             </a:r>
-            <a:endParaRPr/>
-          </a:p>
-        </p:txBody>
-      </p:sp>
-      <p:sp>
-        <p:nvSpPr>
-          <p:cNvPr id="85" name="Google Shape;85;p14"/>
-          <p:cNvSpPr/>
-          <p:nvPr/>
-        </p:nvSpPr>
-        <p:spPr>
-          <a:xfrm>
-            <a:off x="5236950" y="3672175"/>
-            <a:ext cx="123000" cy="123000"/>
-          </a:xfrm>
-          <a:prstGeom prst="flowChartConnector">
-            <a:avLst/>
-          </a:prstGeom>
-          <a:solidFill>
-            <a:srgbClr val="FFFFFF"/>
-          </a:solidFill>
-          <a:ln w="9525" cap="flat" cmpd="sng">
-            <a:solidFill>
-              <a:srgbClr val="000000"/>
-            </a:solidFill>
-            <a:prstDash val="solid"/>
-            <a:round/>
-            <a:headEnd type="none" w="sm" len="sm"/>
-            <a:tailEnd type="none" w="sm" len="sm"/>
-          </a:ln>
-        </p:spPr>
-        <p:txBody>
-          <a:bodyPr spcFirstLastPara="1" wrap="square" lIns="91425" tIns="91425" rIns="91425" bIns="91425" anchor="ctr" anchorCtr="0">
-            <a:noAutofit/>
-          </a:bodyPr>
-          <a:lstStyle/>
-          <a:p>
-            <a:pPr marL="0" lvl="0" indent="0" algn="l" rtl="0">
-              <a:spcBef>
-                <a:spcPts val="0"/>
-              </a:spcBef>
-              <a:spcAft>
-                <a:spcPts val="0"/>
-              </a:spcAft>
-              <a:buNone/>
-            </a:pPr>
-            <a:endParaRPr/>
-          </a:p>
-        </p:txBody>
-      </p:sp>
-      <p:sp>
-        <p:nvSpPr>
-          <p:cNvPr id="86" name="Google Shape;86;p14"/>
+          </a:p>
+        </p:txBody>
+      </p:sp>
+      <p:sp>
+        <p:nvSpPr>
+          <p:cNvPr id="37" name="תיבת טקסט 36">
+            <a:extLst>
+              <a:ext uri="{FF2B5EF4-FFF2-40B4-BE49-F238E27FC236}">
+                <a16:creationId xmlns:a16="http://schemas.microsoft.com/office/drawing/2014/main" id="{73FB06B3-FC47-4D5A-9E22-4DF8B8A02CAD}"/>
+              </a:ext>
+            </a:extLst>
+          </p:cNvPr>
           <p:cNvSpPr txBox="1"/>
           <p:nvPr/>
         </p:nvSpPr>
         <p:spPr>
           <a:xfrm>
-            <a:off x="4396475" y="3536000"/>
-            <a:ext cx="833700" cy="393600"/>
+            <a:off x="4184206" y="3309377"/>
+            <a:ext cx="551037" cy="307777"/>
           </a:xfrm>
           <a:prstGeom prst="rect">
             <a:avLst/>
           </a:prstGeom>
           <a:noFill/>
-          <a:ln>
-            <a:noFill/>
-          </a:ln>
-        </p:spPr>
-        <p:txBody>
-          <a:bodyPr spcFirstLastPara="1" wrap="square" lIns="91425" tIns="91425" rIns="91425" bIns="91425" anchor="t" anchorCtr="0">
-            <a:noAutofit/>
-          </a:bodyPr>
-          <a:lstStyle/>
-          <a:p>
-            <a:pPr marL="0" lvl="0" indent="0" algn="r" rtl="1">
-              <a:spcBef>
-                <a:spcPts val="0"/>
-              </a:spcBef>
-              <a:spcAft>
-                <a:spcPts val="0"/>
-              </a:spcAft>
-              <a:buNone/>
-            </a:pPr>
+        </p:spPr>
+        <p:txBody>
+          <a:bodyPr wrap="square" rtlCol="1">
+            <a:spAutoFit/>
+          </a:bodyPr>
+          <a:lstStyle/>
+          <a:p>
+            <a:pPr algn="r"/>
             <a:r>
-              <a:rPr lang="iw"/>
+              <a:rPr lang="he-IL" dirty="0">
+                <a:solidFill>
+                  <a:schemeClr val="bg1">
+                    <a:lumMod val="65000"/>
+                  </a:schemeClr>
+                </a:solidFill>
+              </a:rPr>
               <a:t>נקבה</a:t>
             </a:r>
-            <a:endParaRPr/>
+          </a:p>
+        </p:txBody>
+      </p:sp>
+      <p:sp>
+        <p:nvSpPr>
+          <p:cNvPr id="38" name="תיבת טקסט 37">
+            <a:extLst>
+              <a:ext uri="{FF2B5EF4-FFF2-40B4-BE49-F238E27FC236}">
+                <a16:creationId xmlns:a16="http://schemas.microsoft.com/office/drawing/2014/main" id="{05E59B41-3BE6-4372-942A-20CC644A48E2}"/>
+              </a:ext>
+            </a:extLst>
+          </p:cNvPr>
+          <p:cNvSpPr txBox="1"/>
+          <p:nvPr/>
+        </p:nvSpPr>
+        <p:spPr>
+          <a:xfrm>
+            <a:off x="3384253" y="3310194"/>
+            <a:ext cx="505246" cy="307777"/>
+          </a:xfrm>
+          <a:prstGeom prst="rect">
+            <a:avLst/>
+          </a:prstGeom>
+          <a:noFill/>
+        </p:spPr>
+        <p:txBody>
+          <a:bodyPr wrap="square" rtlCol="1">
+            <a:spAutoFit/>
+          </a:bodyPr>
+          <a:lstStyle/>
+          <a:p>
+            <a:pPr algn="r"/>
+            <a:r>
+              <a:rPr lang="he-IL" dirty="0">
+                <a:solidFill>
+                  <a:schemeClr val="bg1">
+                    <a:lumMod val="65000"/>
+                  </a:schemeClr>
+                </a:solidFill>
+              </a:rPr>
+              <a:t>אחר</a:t>
+            </a:r>
+          </a:p>
+        </p:txBody>
+      </p:sp>
+      <p:pic>
+        <p:nvPicPr>
+          <p:cNvPr id="5" name="תמונה 4">
+            <a:extLst>
+              <a:ext uri="{FF2B5EF4-FFF2-40B4-BE49-F238E27FC236}">
+                <a16:creationId xmlns:a16="http://schemas.microsoft.com/office/drawing/2014/main" id="{DF8B0A41-B381-4021-A1E2-DA95E25C4DF2}"/>
+              </a:ext>
+            </a:extLst>
+          </p:cNvPr>
+          <p:cNvPicPr>
+            <a:picLocks noChangeAspect="1"/>
+          </p:cNvPicPr>
+          <p:nvPr/>
+        </p:nvPicPr>
+        <p:blipFill>
+          <a:blip r:embed="rId7"/>
+          <a:stretch>
+            <a:fillRect/>
+          </a:stretch>
+        </p:blipFill>
+        <p:spPr>
+          <a:xfrm>
+            <a:off x="5541788" y="3349437"/>
+            <a:ext cx="209550" cy="209550"/>
+          </a:xfrm>
+          <a:prstGeom prst="rect">
+            <a:avLst/>
+          </a:prstGeom>
+        </p:spPr>
+      </p:pic>
+      <p:pic>
+        <p:nvPicPr>
+          <p:cNvPr id="7" name="תמונה 6">
+            <a:extLst>
+              <a:ext uri="{FF2B5EF4-FFF2-40B4-BE49-F238E27FC236}">
+                <a16:creationId xmlns:a16="http://schemas.microsoft.com/office/drawing/2014/main" id="{2D538D5A-EBDD-4137-A781-94F2BFDE55F7}"/>
+              </a:ext>
+            </a:extLst>
+          </p:cNvPr>
+          <p:cNvPicPr>
+            <a:picLocks noChangeAspect="1"/>
+          </p:cNvPicPr>
+          <p:nvPr/>
+        </p:nvPicPr>
+        <p:blipFill>
+          <a:blip r:embed="rId8"/>
+          <a:stretch>
+            <a:fillRect/>
+          </a:stretch>
+        </p:blipFill>
+        <p:spPr>
+          <a:xfrm>
+            <a:off x="4824285" y="3373249"/>
+            <a:ext cx="195263" cy="185738"/>
+          </a:xfrm>
+          <a:prstGeom prst="rect">
+            <a:avLst/>
+          </a:prstGeom>
+        </p:spPr>
+      </p:pic>
+      <p:pic>
+        <p:nvPicPr>
+          <p:cNvPr id="42" name="תמונה 41">
+            <a:extLst>
+              <a:ext uri="{FF2B5EF4-FFF2-40B4-BE49-F238E27FC236}">
+                <a16:creationId xmlns:a16="http://schemas.microsoft.com/office/drawing/2014/main" id="{D372851D-4604-4424-9850-21D90001BC5C}"/>
+              </a:ext>
+            </a:extLst>
+          </p:cNvPr>
+          <p:cNvPicPr>
+            <a:picLocks noChangeAspect="1"/>
+          </p:cNvPicPr>
+          <p:nvPr/>
+        </p:nvPicPr>
+        <p:blipFill>
+          <a:blip r:embed="rId8"/>
+          <a:stretch>
+            <a:fillRect/>
+          </a:stretch>
+        </p:blipFill>
+        <p:spPr>
+          <a:xfrm>
+            <a:off x="3935290" y="3377127"/>
+            <a:ext cx="195263" cy="185738"/>
+          </a:xfrm>
+          <a:prstGeom prst="rect">
+            <a:avLst/>
+          </a:prstGeom>
+        </p:spPr>
+      </p:pic>
+      <p:cxnSp>
+        <p:nvCxnSpPr>
+          <p:cNvPr id="45" name="מחבר ישר 44">
+            <a:extLst>
+              <a:ext uri="{FF2B5EF4-FFF2-40B4-BE49-F238E27FC236}">
+                <a16:creationId xmlns:a16="http://schemas.microsoft.com/office/drawing/2014/main" id="{40814027-D2B6-4392-BF52-EE0ADA9F6382}"/>
+              </a:ext>
+            </a:extLst>
+          </p:cNvPr>
+          <p:cNvCxnSpPr/>
+          <p:nvPr/>
+        </p:nvCxnSpPr>
+        <p:spPr>
+          <a:xfrm flipH="1">
+            <a:off x="3015649" y="1348363"/>
+            <a:ext cx="3199503" cy="0"/>
+          </a:xfrm>
+          <a:prstGeom prst="line">
+            <a:avLst/>
+          </a:prstGeom>
+          <a:ln>
+            <a:solidFill>
+              <a:schemeClr val="tx1"/>
+            </a:solidFill>
+          </a:ln>
+        </p:spPr>
+        <p:style>
+          <a:lnRef idx="1">
+            <a:schemeClr val="accent1"/>
+          </a:lnRef>
+          <a:fillRef idx="0">
+            <a:schemeClr val="accent1"/>
+          </a:fillRef>
+          <a:effectRef idx="0">
+            <a:schemeClr val="accent1"/>
+          </a:effectRef>
+          <a:fontRef idx="minor">
+            <a:schemeClr val="tx1"/>
+          </a:fontRef>
+        </p:style>
+      </p:cxnSp>
+      <p:sp>
+        <p:nvSpPr>
+          <p:cNvPr id="46" name="תיבת טקסט 45">
+            <a:extLst>
+              <a:ext uri="{FF2B5EF4-FFF2-40B4-BE49-F238E27FC236}">
+                <a16:creationId xmlns:a16="http://schemas.microsoft.com/office/drawing/2014/main" id="{700F23A1-8788-448E-8781-8E31250B9EA6}"/>
+              </a:ext>
+            </a:extLst>
+          </p:cNvPr>
+          <p:cNvSpPr txBox="1"/>
+          <p:nvPr/>
+        </p:nvSpPr>
+        <p:spPr>
+          <a:xfrm>
+            <a:off x="6145355" y="951021"/>
+            <a:ext cx="201555" cy="369332"/>
+          </a:xfrm>
+          <a:prstGeom prst="rect">
+            <a:avLst/>
+          </a:prstGeom>
+          <a:noFill/>
+        </p:spPr>
+        <p:txBody>
+          <a:bodyPr wrap="square" rtlCol="1">
+            <a:spAutoFit/>
+          </a:bodyPr>
+          <a:lstStyle/>
+          <a:p>
+            <a:pPr algn="r"/>
+            <a:r>
+              <a:rPr lang="he-IL" sz="1800" dirty="0">
+                <a:solidFill>
+                  <a:schemeClr val="bg1">
+                    <a:lumMod val="50000"/>
+                  </a:schemeClr>
+                </a:solidFill>
+              </a:rPr>
+              <a:t>*</a:t>
+            </a:r>
+          </a:p>
+        </p:txBody>
+      </p:sp>
+      <p:sp>
+        <p:nvSpPr>
+          <p:cNvPr id="47" name="תיבת טקסט 46">
+            <a:extLst>
+              <a:ext uri="{FF2B5EF4-FFF2-40B4-BE49-F238E27FC236}">
+                <a16:creationId xmlns:a16="http://schemas.microsoft.com/office/drawing/2014/main" id="{8B28BB43-796E-46F3-924F-F2E6701B5AC8}"/>
+              </a:ext>
+            </a:extLst>
+          </p:cNvPr>
+          <p:cNvSpPr txBox="1"/>
+          <p:nvPr/>
+        </p:nvSpPr>
+        <p:spPr>
+          <a:xfrm>
+            <a:off x="6167894" y="1441356"/>
+            <a:ext cx="201555" cy="369332"/>
+          </a:xfrm>
+          <a:prstGeom prst="rect">
+            <a:avLst/>
+          </a:prstGeom>
+          <a:noFill/>
+        </p:spPr>
+        <p:txBody>
+          <a:bodyPr wrap="square" rtlCol="1">
+            <a:spAutoFit/>
+          </a:bodyPr>
+          <a:lstStyle/>
+          <a:p>
+            <a:pPr algn="r"/>
+            <a:r>
+              <a:rPr lang="he-IL" sz="1800" dirty="0">
+                <a:solidFill>
+                  <a:schemeClr val="bg1">
+                    <a:lumMod val="50000"/>
+                  </a:schemeClr>
+                </a:solidFill>
+              </a:rPr>
+              <a:t>*</a:t>
+            </a:r>
+          </a:p>
+        </p:txBody>
+      </p:sp>
+      <p:sp>
+        <p:nvSpPr>
+          <p:cNvPr id="48" name="תיבת טקסט 47">
+            <a:extLst>
+              <a:ext uri="{FF2B5EF4-FFF2-40B4-BE49-F238E27FC236}">
+                <a16:creationId xmlns:a16="http://schemas.microsoft.com/office/drawing/2014/main" id="{7733EBD5-E64C-4531-B42C-364ECA11488F}"/>
+              </a:ext>
+            </a:extLst>
+          </p:cNvPr>
+          <p:cNvSpPr txBox="1"/>
+          <p:nvPr/>
+        </p:nvSpPr>
+        <p:spPr>
+          <a:xfrm>
+            <a:off x="6167895" y="2070671"/>
+            <a:ext cx="201555" cy="369332"/>
+          </a:xfrm>
+          <a:prstGeom prst="rect">
+            <a:avLst/>
+          </a:prstGeom>
+          <a:noFill/>
+        </p:spPr>
+        <p:txBody>
+          <a:bodyPr wrap="square" rtlCol="1">
+            <a:spAutoFit/>
+          </a:bodyPr>
+          <a:lstStyle/>
+          <a:p>
+            <a:pPr algn="r"/>
+            <a:r>
+              <a:rPr lang="he-IL" sz="1800" dirty="0">
+                <a:solidFill>
+                  <a:schemeClr val="bg1">
+                    <a:lumMod val="50000"/>
+                  </a:schemeClr>
+                </a:solidFill>
+              </a:rPr>
+              <a:t>*</a:t>
+            </a:r>
+          </a:p>
+        </p:txBody>
+      </p:sp>
+      <p:sp>
+        <p:nvSpPr>
+          <p:cNvPr id="49" name="תיבת טקסט 48">
+            <a:extLst>
+              <a:ext uri="{FF2B5EF4-FFF2-40B4-BE49-F238E27FC236}">
+                <a16:creationId xmlns:a16="http://schemas.microsoft.com/office/drawing/2014/main" id="{5771ABA7-C7FA-47AE-BCB6-04D92FCE0797}"/>
+              </a:ext>
+            </a:extLst>
+          </p:cNvPr>
+          <p:cNvSpPr txBox="1"/>
+          <p:nvPr/>
+        </p:nvSpPr>
+        <p:spPr>
+          <a:xfrm>
+            <a:off x="6167893" y="2665815"/>
+            <a:ext cx="201555" cy="369332"/>
+          </a:xfrm>
+          <a:prstGeom prst="rect">
+            <a:avLst/>
+          </a:prstGeom>
+          <a:noFill/>
+        </p:spPr>
+        <p:txBody>
+          <a:bodyPr wrap="square" rtlCol="1">
+            <a:spAutoFit/>
+          </a:bodyPr>
+          <a:lstStyle/>
+          <a:p>
+            <a:pPr algn="r"/>
+            <a:r>
+              <a:rPr lang="he-IL" sz="1800" dirty="0">
+                <a:solidFill>
+                  <a:schemeClr val="bg1">
+                    <a:lumMod val="50000"/>
+                  </a:schemeClr>
+                </a:solidFill>
+              </a:rPr>
+              <a:t>*</a:t>
+            </a:r>
+          </a:p>
+        </p:txBody>
+      </p:sp>
+      <p:sp>
+        <p:nvSpPr>
+          <p:cNvPr id="50" name="תיבת טקסט 49">
+            <a:extLst>
+              <a:ext uri="{FF2B5EF4-FFF2-40B4-BE49-F238E27FC236}">
+                <a16:creationId xmlns:a16="http://schemas.microsoft.com/office/drawing/2014/main" id="{11841229-2D0D-4286-AEF9-D7DF29503017}"/>
+              </a:ext>
+            </a:extLst>
+          </p:cNvPr>
+          <p:cNvSpPr txBox="1"/>
+          <p:nvPr/>
+        </p:nvSpPr>
+        <p:spPr>
+          <a:xfrm>
+            <a:off x="6169197" y="3176797"/>
+            <a:ext cx="201555" cy="369332"/>
+          </a:xfrm>
+          <a:prstGeom prst="rect">
+            <a:avLst/>
+          </a:prstGeom>
+          <a:noFill/>
+        </p:spPr>
+        <p:txBody>
+          <a:bodyPr wrap="square" rtlCol="1">
+            <a:spAutoFit/>
+          </a:bodyPr>
+          <a:lstStyle/>
+          <a:p>
+            <a:pPr algn="r"/>
+            <a:r>
+              <a:rPr lang="he-IL" sz="1800" dirty="0">
+                <a:solidFill>
+                  <a:schemeClr val="bg1">
+                    <a:lumMod val="50000"/>
+                  </a:schemeClr>
+                </a:solidFill>
+              </a:rPr>
+              <a:t>*</a:t>
+            </a:r>
+          </a:p>
+        </p:txBody>
+      </p:sp>
+      <p:sp>
+        <p:nvSpPr>
+          <p:cNvPr id="51" name="תיבת טקסט 50">
+            <a:extLst>
+              <a:ext uri="{FF2B5EF4-FFF2-40B4-BE49-F238E27FC236}">
+                <a16:creationId xmlns:a16="http://schemas.microsoft.com/office/drawing/2014/main" id="{1B948E63-3E70-461D-B420-48EFF0F8BB37}"/>
+              </a:ext>
+            </a:extLst>
+          </p:cNvPr>
+          <p:cNvSpPr txBox="1"/>
+          <p:nvPr/>
+        </p:nvSpPr>
+        <p:spPr>
+          <a:xfrm>
+            <a:off x="4550735" y="3652811"/>
+            <a:ext cx="1888056" cy="369332"/>
+          </a:xfrm>
+          <a:prstGeom prst="rect">
+            <a:avLst/>
+          </a:prstGeom>
+          <a:noFill/>
+        </p:spPr>
+        <p:txBody>
+          <a:bodyPr wrap="square" rtlCol="1">
+            <a:spAutoFit/>
+          </a:bodyPr>
+          <a:lstStyle/>
+          <a:p>
+            <a:pPr algn="r"/>
+            <a:r>
+              <a:rPr lang="he-IL" sz="1800" dirty="0">
+                <a:solidFill>
+                  <a:schemeClr val="bg1">
+                    <a:lumMod val="50000"/>
+                  </a:schemeClr>
+                </a:solidFill>
+              </a:rPr>
+              <a:t>*</a:t>
+            </a:r>
+            <a:r>
+              <a:rPr lang="he-IL" sz="1200" dirty="0">
+                <a:solidFill>
+                  <a:schemeClr val="bg1">
+                    <a:lumMod val="50000"/>
+                  </a:schemeClr>
+                </a:solidFill>
+              </a:rPr>
+              <a:t> שדות חובה</a:t>
+            </a:r>
+          </a:p>
+        </p:txBody>
+      </p:sp>
+      <p:pic>
+        <p:nvPicPr>
+          <p:cNvPr id="12" name="תמונה 11">
+            <a:extLst>
+              <a:ext uri="{FF2B5EF4-FFF2-40B4-BE49-F238E27FC236}">
+                <a16:creationId xmlns:a16="http://schemas.microsoft.com/office/drawing/2014/main" id="{5902FE88-D140-4230-9F48-9D7F6F4D4A2B}"/>
+              </a:ext>
+            </a:extLst>
+          </p:cNvPr>
+          <p:cNvPicPr>
+            <a:picLocks noChangeAspect="1"/>
+          </p:cNvPicPr>
+          <p:nvPr/>
+        </p:nvPicPr>
+        <p:blipFill>
+          <a:blip r:embed="rId9"/>
+          <a:stretch>
+            <a:fillRect/>
+          </a:stretch>
+        </p:blipFill>
+        <p:spPr>
+          <a:xfrm>
+            <a:off x="5247521" y="4400211"/>
+            <a:ext cx="1053788" cy="412352"/>
+          </a:xfrm>
+          <a:prstGeom prst="rect">
+            <a:avLst/>
+          </a:prstGeom>
+        </p:spPr>
+      </p:pic>
+      <p:sp>
+        <p:nvSpPr>
+          <p:cNvPr id="13" name="מלבן 12">
+            <a:extLst>
+              <a:ext uri="{FF2B5EF4-FFF2-40B4-BE49-F238E27FC236}">
+                <a16:creationId xmlns:a16="http://schemas.microsoft.com/office/drawing/2014/main" id="{B9E01441-1CBA-4FC2-A8A3-CE1C6473F4F9}"/>
+              </a:ext>
+            </a:extLst>
+          </p:cNvPr>
+          <p:cNvSpPr/>
+          <p:nvPr/>
+        </p:nvSpPr>
+        <p:spPr>
+          <a:xfrm>
+            <a:off x="5327661" y="4497175"/>
+            <a:ext cx="913390" cy="233994"/>
+          </a:xfrm>
+          <a:prstGeom prst="rect">
+            <a:avLst/>
+          </a:prstGeom>
+          <a:solidFill>
+            <a:srgbClr val="F5F5F5"/>
+          </a:solidFill>
+          <a:ln>
+            <a:solidFill>
+              <a:srgbClr val="F5F5F5"/>
+            </a:solidFill>
+          </a:ln>
+        </p:spPr>
+        <p:style>
+          <a:lnRef idx="2">
+            <a:schemeClr val="accent1">
+              <a:shade val="50000"/>
+            </a:schemeClr>
+          </a:lnRef>
+          <a:fillRef idx="1">
+            <a:schemeClr val="accent1"/>
+          </a:fillRef>
+          <a:effectRef idx="0">
+            <a:schemeClr val="accent1"/>
+          </a:effectRef>
+          <a:fontRef idx="minor">
+            <a:schemeClr val="lt1"/>
+          </a:fontRef>
+        </p:style>
+        <p:txBody>
+          <a:bodyPr rtlCol="1" anchor="ctr"/>
+          <a:lstStyle/>
+          <a:p>
+            <a:pPr algn="ctr"/>
+            <a:endParaRPr lang="he-IL"/>
+          </a:p>
+        </p:txBody>
+      </p:sp>
+      <p:sp>
+        <p:nvSpPr>
+          <p:cNvPr id="14" name="תיבת טקסט 13">
+            <a:extLst>
+              <a:ext uri="{FF2B5EF4-FFF2-40B4-BE49-F238E27FC236}">
+                <a16:creationId xmlns:a16="http://schemas.microsoft.com/office/drawing/2014/main" id="{AE31F58A-F247-49ED-8DB1-BF87EDD3BD28}"/>
+              </a:ext>
+            </a:extLst>
+          </p:cNvPr>
+          <p:cNvSpPr txBox="1"/>
+          <p:nvPr/>
+        </p:nvSpPr>
+        <p:spPr>
+          <a:xfrm>
+            <a:off x="5485506" y="4433241"/>
+            <a:ext cx="592864" cy="338554"/>
+          </a:xfrm>
+          <a:prstGeom prst="rect">
+            <a:avLst/>
+          </a:prstGeom>
+          <a:noFill/>
+        </p:spPr>
+        <p:txBody>
+          <a:bodyPr wrap="square" rtlCol="1">
+            <a:spAutoFit/>
+          </a:bodyPr>
+          <a:lstStyle/>
+          <a:p>
+            <a:pPr algn="r"/>
+            <a:r>
+              <a:rPr lang="he-IL" sz="1600" dirty="0">
+                <a:solidFill>
+                  <a:srgbClr val="89B7E3"/>
+                </a:solidFill>
+              </a:rPr>
+              <a:t>חזור</a:t>
+            </a:r>
           </a:p>
         </p:txBody>
       </p:sp>

</xml_diff>